<commit_message>
mise à jour diapo
</commit_message>
<xml_diff>
--- a/SoutenanceProjetFinal.pptx
+++ b/SoutenanceProjetFinal.pptx
@@ -5,7 +5,7 @@
     <p:sldMasterId id="2147483648" r:id="rId1"/>
   </p:sldMasterIdLst>
   <p:notesMasterIdLst>
-    <p:notesMasterId r:id="rId18"/>
+    <p:notesMasterId r:id="rId16"/>
   </p:notesMasterIdLst>
   <p:sldIdLst>
     <p:sldId id="256" r:id="rId2"/>
@@ -16,14 +16,12 @@
     <p:sldId id="258" r:id="rId7"/>
     <p:sldId id="259" r:id="rId8"/>
     <p:sldId id="270" r:id="rId9"/>
-    <p:sldId id="266" r:id="rId10"/>
-    <p:sldId id="273" r:id="rId11"/>
-    <p:sldId id="274" r:id="rId12"/>
-    <p:sldId id="260" r:id="rId13"/>
-    <p:sldId id="262" r:id="rId14"/>
-    <p:sldId id="271" r:id="rId15"/>
-    <p:sldId id="269" r:id="rId16"/>
-    <p:sldId id="272" r:id="rId17"/>
+    <p:sldId id="273" r:id="rId10"/>
+    <p:sldId id="260" r:id="rId11"/>
+    <p:sldId id="262" r:id="rId12"/>
+    <p:sldId id="271" r:id="rId13"/>
+    <p:sldId id="269" r:id="rId14"/>
+    <p:sldId id="272" r:id="rId15"/>
   </p:sldIdLst>
   <p:sldSz cx="12192000" cy="6858000"/>
   <p:notesSz cx="6858000" cy="9144000"/>
@@ -6961,268 +6959,6 @@
           <a:chExt cx="0" cy="0"/>
         </a:xfrm>
       </p:grpSpPr>
-      <p:pic>
-        <p:nvPicPr>
-          <p:cNvPr id="5" name="Image 4">
-            <a:extLst>
-              <a:ext uri="{FF2B5EF4-FFF2-40B4-BE49-F238E27FC236}">
-                <a16:creationId xmlns:a16="http://schemas.microsoft.com/office/drawing/2014/main" id="{2C86FEB7-2BE9-204A-62C7-A57B8AAD3707}"/>
-              </a:ext>
-            </a:extLst>
-          </p:cNvPr>
-          <p:cNvPicPr>
-            <a:picLocks noChangeAspect="1"/>
-          </p:cNvPicPr>
-          <p:nvPr/>
-        </p:nvPicPr>
-        <p:blipFill>
-          <a:blip r:embed="rId2">
-            <a:extLst>
-              <a:ext uri="{28A0092B-C50C-407E-A947-70E740481C1C}">
-                <a14:useLocalDpi xmlns:a14="http://schemas.microsoft.com/office/drawing/2010/main" val="0"/>
-              </a:ext>
-            </a:extLst>
-          </a:blip>
-          <a:stretch>
-            <a:fillRect/>
-          </a:stretch>
-        </p:blipFill>
-        <p:spPr>
-          <a:xfrm>
-            <a:off x="233706" y="541523"/>
-            <a:ext cx="5648765" cy="5116999"/>
-          </a:xfrm>
-          <a:prstGeom prst="rect">
-            <a:avLst/>
-          </a:prstGeom>
-        </p:spPr>
-      </p:pic>
-      <p:pic>
-        <p:nvPicPr>
-          <p:cNvPr id="7" name="Image 6">
-            <a:extLst>
-              <a:ext uri="{FF2B5EF4-FFF2-40B4-BE49-F238E27FC236}">
-                <a16:creationId xmlns:a16="http://schemas.microsoft.com/office/drawing/2014/main" id="{8B163AD8-0E73-0734-8167-4599A7AE1D51}"/>
-              </a:ext>
-            </a:extLst>
-          </p:cNvPr>
-          <p:cNvPicPr>
-            <a:picLocks noChangeAspect="1"/>
-          </p:cNvPicPr>
-          <p:nvPr/>
-        </p:nvPicPr>
-        <p:blipFill>
-          <a:blip r:embed="rId3">
-            <a:extLst>
-              <a:ext uri="{28A0092B-C50C-407E-A947-70E740481C1C}">
-                <a14:useLocalDpi xmlns:a14="http://schemas.microsoft.com/office/drawing/2010/main" val="0"/>
-              </a:ext>
-            </a:extLst>
-          </a:blip>
-          <a:stretch>
-            <a:fillRect/>
-          </a:stretch>
-        </p:blipFill>
-        <p:spPr>
-          <a:xfrm>
-            <a:off x="5999694" y="541523"/>
-            <a:ext cx="5675089" cy="5082906"/>
-          </a:xfrm>
-          <a:prstGeom prst="rect">
-            <a:avLst/>
-          </a:prstGeom>
-        </p:spPr>
-      </p:pic>
-      <p:sp>
-        <p:nvSpPr>
-          <p:cNvPr id="8" name="Espace réservé du numéro de diapositive 7">
-            <a:extLst>
-              <a:ext uri="{FF2B5EF4-FFF2-40B4-BE49-F238E27FC236}">
-                <a16:creationId xmlns:a16="http://schemas.microsoft.com/office/drawing/2014/main" id="{CA3143A8-D022-A759-2B8E-7E30CF59E316}"/>
-              </a:ext>
-            </a:extLst>
-          </p:cNvPr>
-          <p:cNvSpPr>
-            <a:spLocks noGrp="1"/>
-          </p:cNvSpPr>
-          <p:nvPr>
-            <p:ph type="sldNum" sz="quarter" idx="12"/>
-          </p:nvPr>
-        </p:nvSpPr>
-        <p:spPr/>
-        <p:txBody>
-          <a:bodyPr/>
-          <a:lstStyle/>
-          <a:p>
-            <a:fld id="{8884DEA1-B58E-449F-B7DA-47C0412597B5}" type="slidenum">
-              <a:rPr lang="fr-FR" smtClean="0"/>
-              <a:t>10</a:t>
-            </a:fld>
-            <a:endParaRPr lang="fr-FR"/>
-          </a:p>
-        </p:txBody>
-      </p:sp>
-    </p:spTree>
-    <p:extLst>
-      <p:ext uri="{BB962C8B-B14F-4D97-AF65-F5344CB8AC3E}">
-        <p14:creationId xmlns:p14="http://schemas.microsoft.com/office/powerpoint/2010/main" val="3575519456"/>
-      </p:ext>
-    </p:extLst>
-  </p:cSld>
-  <p:clrMapOvr>
-    <a:masterClrMapping/>
-  </p:clrMapOvr>
-</p:sld>
-</file>
-
-<file path=ppt/slides/slide11.xml><?xml version="1.0" encoding="utf-8"?>
-<p:sld xmlns:a="http://schemas.openxmlformats.org/drawingml/2006/main" xmlns:r="http://schemas.openxmlformats.org/officeDocument/2006/relationships" xmlns:p="http://schemas.openxmlformats.org/presentationml/2006/main">
-  <p:cSld>
-    <p:spTree>
-      <p:nvGrpSpPr>
-        <p:cNvPr id="1" name=""/>
-        <p:cNvGrpSpPr/>
-        <p:nvPr/>
-      </p:nvGrpSpPr>
-      <p:grpSpPr>
-        <a:xfrm>
-          <a:off x="0" y="0"/>
-          <a:ext cx="0" cy="0"/>
-          <a:chOff x="0" y="0"/>
-          <a:chExt cx="0" cy="0"/>
-        </a:xfrm>
-      </p:grpSpPr>
-      <p:pic>
-        <p:nvPicPr>
-          <p:cNvPr id="5" name="Image 4">
-            <a:extLst>
-              <a:ext uri="{FF2B5EF4-FFF2-40B4-BE49-F238E27FC236}">
-                <a16:creationId xmlns:a16="http://schemas.microsoft.com/office/drawing/2014/main" id="{9B393C99-14B4-484B-DED0-FEB357810C6C}"/>
-              </a:ext>
-            </a:extLst>
-          </p:cNvPr>
-          <p:cNvPicPr>
-            <a:picLocks noChangeAspect="1"/>
-          </p:cNvPicPr>
-          <p:nvPr/>
-        </p:nvPicPr>
-        <p:blipFill>
-          <a:blip r:embed="rId2">
-            <a:extLst>
-              <a:ext uri="{28A0092B-C50C-407E-A947-70E740481C1C}">
-                <a14:useLocalDpi xmlns:a14="http://schemas.microsoft.com/office/drawing/2010/main" val="0"/>
-              </a:ext>
-            </a:extLst>
-          </a:blip>
-          <a:stretch>
-            <a:fillRect/>
-          </a:stretch>
-        </p:blipFill>
-        <p:spPr>
-          <a:xfrm>
-            <a:off x="202196" y="757347"/>
-            <a:ext cx="5653843" cy="5234661"/>
-          </a:xfrm>
-          <a:prstGeom prst="rect">
-            <a:avLst/>
-          </a:prstGeom>
-        </p:spPr>
-      </p:pic>
-      <p:pic>
-        <p:nvPicPr>
-          <p:cNvPr id="7" name="Image 6">
-            <a:extLst>
-              <a:ext uri="{FF2B5EF4-FFF2-40B4-BE49-F238E27FC236}">
-                <a16:creationId xmlns:a16="http://schemas.microsoft.com/office/drawing/2014/main" id="{98CD8430-A20F-C4C6-FB9F-CA2B1F55C3CC}"/>
-              </a:ext>
-            </a:extLst>
-          </p:cNvPr>
-          <p:cNvPicPr>
-            <a:picLocks noChangeAspect="1"/>
-          </p:cNvPicPr>
-          <p:nvPr/>
-        </p:nvPicPr>
-        <p:blipFill>
-          <a:blip r:embed="rId3">
-            <a:extLst>
-              <a:ext uri="{28A0092B-C50C-407E-A947-70E740481C1C}">
-                <a14:useLocalDpi xmlns:a14="http://schemas.microsoft.com/office/drawing/2010/main" val="0"/>
-              </a:ext>
-            </a:extLst>
-          </a:blip>
-          <a:stretch>
-            <a:fillRect/>
-          </a:stretch>
-        </p:blipFill>
-        <p:spPr>
-          <a:xfrm>
-            <a:off x="6096000" y="757346"/>
-            <a:ext cx="5718971" cy="5234661"/>
-          </a:xfrm>
-          <a:prstGeom prst="rect">
-            <a:avLst/>
-          </a:prstGeom>
-        </p:spPr>
-      </p:pic>
-      <p:sp>
-        <p:nvSpPr>
-          <p:cNvPr id="8" name="Espace réservé du numéro de diapositive 7">
-            <a:extLst>
-              <a:ext uri="{FF2B5EF4-FFF2-40B4-BE49-F238E27FC236}">
-                <a16:creationId xmlns:a16="http://schemas.microsoft.com/office/drawing/2014/main" id="{ACC754FE-D67F-D11D-31F3-F44BDD4BEF88}"/>
-              </a:ext>
-            </a:extLst>
-          </p:cNvPr>
-          <p:cNvSpPr>
-            <a:spLocks noGrp="1"/>
-          </p:cNvSpPr>
-          <p:nvPr>
-            <p:ph type="sldNum" sz="quarter" idx="12"/>
-          </p:nvPr>
-        </p:nvSpPr>
-        <p:spPr/>
-        <p:txBody>
-          <a:bodyPr/>
-          <a:lstStyle/>
-          <a:p>
-            <a:fld id="{8884DEA1-B58E-449F-B7DA-47C0412597B5}" type="slidenum">
-              <a:rPr lang="fr-FR" smtClean="0"/>
-              <a:t>11</a:t>
-            </a:fld>
-            <a:endParaRPr lang="fr-FR"/>
-          </a:p>
-        </p:txBody>
-      </p:sp>
-    </p:spTree>
-    <p:extLst>
-      <p:ext uri="{BB962C8B-B14F-4D97-AF65-F5344CB8AC3E}">
-        <p14:creationId xmlns:p14="http://schemas.microsoft.com/office/powerpoint/2010/main" val="4229787710"/>
-      </p:ext>
-    </p:extLst>
-  </p:cSld>
-  <p:clrMapOvr>
-    <a:masterClrMapping/>
-  </p:clrMapOvr>
-</p:sld>
-</file>
-
-<file path=ppt/slides/slide12.xml><?xml version="1.0" encoding="utf-8"?>
-<p:sld xmlns:a="http://schemas.openxmlformats.org/drawingml/2006/main" xmlns:r="http://schemas.openxmlformats.org/officeDocument/2006/relationships" xmlns:p="http://schemas.openxmlformats.org/presentationml/2006/main">
-  <p:cSld>
-    <p:spTree>
-      <p:nvGrpSpPr>
-        <p:cNvPr id="1" name=""/>
-        <p:cNvGrpSpPr/>
-        <p:nvPr/>
-      </p:nvGrpSpPr>
-      <p:grpSpPr>
-        <a:xfrm>
-          <a:off x="0" y="0"/>
-          <a:ext cx="0" cy="0"/>
-          <a:chOff x="0" y="0"/>
-          <a:chExt cx="0" cy="0"/>
-        </a:xfrm>
-      </p:grpSpPr>
       <p:sp useBgFill="1">
         <p:nvSpPr>
           <p:cNvPr id="13" name="Rectangle 12">
@@ -7443,7 +7179,7 @@
                   <a:spcPts val="600"/>
                 </a:spcAft>
               </a:pPr>
-              <a:t>12</a:t>
+              <a:t>10</a:t>
             </a:fld>
             <a:endParaRPr lang="en-US"/>
           </a:p>
@@ -7462,7 +7198,7 @@
 </p:sld>
 </file>
 
-<file path=ppt/slides/slide13.xml><?xml version="1.0" encoding="utf-8"?>
+<file path=ppt/slides/slide11.xml><?xml version="1.0" encoding="utf-8"?>
 <p:sld xmlns:a="http://schemas.openxmlformats.org/drawingml/2006/main" xmlns:r="http://schemas.openxmlformats.org/officeDocument/2006/relationships" xmlns:p="http://schemas.openxmlformats.org/presentationml/2006/main">
   <p:cSld>
     <p:spTree>
@@ -7575,7 +7311,7 @@
           <a:p>
             <a:fld id="{8884DEA1-B58E-449F-B7DA-47C0412597B5}" type="slidenum">
               <a:rPr lang="fr-FR" smtClean="0"/>
-              <a:t>13</a:t>
+              <a:t>11</a:t>
             </a:fld>
             <a:endParaRPr lang="fr-FR"/>
           </a:p>
@@ -7594,7 +7330,7 @@
 </p:sld>
 </file>
 
-<file path=ppt/slides/slide14.xml><?xml version="1.0" encoding="utf-8"?>
+<file path=ppt/slides/slide12.xml><?xml version="1.0" encoding="utf-8"?>
 <p:sld xmlns:a="http://schemas.openxmlformats.org/drawingml/2006/main" xmlns:r="http://schemas.openxmlformats.org/officeDocument/2006/relationships" xmlns:p="http://schemas.openxmlformats.org/presentationml/2006/main">
   <p:cSld>
     <p:spTree>
@@ -7726,7 +7462,7 @@
           <a:p>
             <a:fld id="{8884DEA1-B58E-449F-B7DA-47C0412597B5}" type="slidenum">
               <a:rPr lang="fr-FR" smtClean="0"/>
-              <a:t>14</a:t>
+              <a:t>12</a:t>
             </a:fld>
             <a:endParaRPr lang="fr-FR"/>
           </a:p>
@@ -7745,7 +7481,7 @@
 </p:sld>
 </file>
 
-<file path=ppt/slides/slide15.xml><?xml version="1.0" encoding="utf-8"?>
+<file path=ppt/slides/slide13.xml><?xml version="1.0" encoding="utf-8"?>
 <p:sld xmlns:a="http://schemas.openxmlformats.org/drawingml/2006/main" xmlns:r="http://schemas.openxmlformats.org/officeDocument/2006/relationships" xmlns:p="http://schemas.openxmlformats.org/presentationml/2006/main">
   <p:cSld>
     <p:spTree>
@@ -7823,7 +7559,7 @@
           <a:p>
             <a:fld id="{8884DEA1-B58E-449F-B7DA-47C0412597B5}" type="slidenum">
               <a:rPr lang="fr-FR" smtClean="0"/>
-              <a:t>15</a:t>
+              <a:t>13</a:t>
             </a:fld>
             <a:endParaRPr lang="fr-FR"/>
           </a:p>
@@ -7842,7 +7578,7 @@
 </p:sld>
 </file>
 
-<file path=ppt/slides/slide16.xml><?xml version="1.0" encoding="utf-8"?>
+<file path=ppt/slides/slide14.xml><?xml version="1.0" encoding="utf-8"?>
 <p:sld xmlns:a="http://schemas.openxmlformats.org/drawingml/2006/main" xmlns:r="http://schemas.openxmlformats.org/officeDocument/2006/relationships" xmlns:p="http://schemas.openxmlformats.org/presentationml/2006/main">
   <p:cSld>
     <p:spTree>
@@ -7916,7 +7652,7 @@
           <a:p>
             <a:fld id="{8884DEA1-B58E-449F-B7DA-47C0412597B5}" type="slidenum">
               <a:rPr lang="fr-FR" smtClean="0"/>
-              <a:t>16</a:t>
+              <a:t>14</a:t>
             </a:fld>
             <a:endParaRPr lang="fr-FR"/>
           </a:p>
@@ -8405,7 +8141,7 @@
             <p:ph idx="1"/>
             <p:extLst>
               <p:ext uri="{D42A27DB-BD31-4B8C-83A1-F6EECF244321}">
-                <p14:modId xmlns:p14="http://schemas.microsoft.com/office/powerpoint/2010/main" val="1088482630"/>
+                <p14:modId xmlns:p14="http://schemas.microsoft.com/office/powerpoint/2010/main" val="606416707"/>
               </p:ext>
             </p:extLst>
           </p:nvPr>
@@ -9167,7 +8903,7 @@
                 </a:extLst>
               </a:tr>
               <a:tr h="579570">
-                <a:tc>
+                <a:tc rowSpan="2">
                   <a:txBody>
                     <a:bodyPr/>
                     <a:lstStyle/>
@@ -9862,7 +9598,7 @@
                 </a:extLst>
               </a:tr>
               <a:tr h="533204">
-                <a:tc>
+                <a:tc vMerge="1">
                   <a:txBody>
                     <a:bodyPr/>
                     <a:lstStyle/>
@@ -10562,27 +10298,8 @@
                           <a:ea typeface="Open Sans" panose="020B0606030504020204" pitchFamily="34" charset="0"/>
                           <a:cs typeface="Open Sans" panose="020B0606030504020204" pitchFamily="34" charset="0"/>
                         </a:rPr>
-                        <a:t>Conception </a:t>
+                        <a:t>Conception</a:t>
                       </a:r>
-                      <a:r>
-                        <a:rPr lang="en-US" sz="1600" b="1" kern="1200" dirty="0" err="1">
-                          <a:solidFill>
-                            <a:schemeClr val="tx1"/>
-                          </a:solidFill>
-                          <a:latin typeface="Open Sans" panose="020B0606030504020204" pitchFamily="34" charset="0"/>
-                          <a:ea typeface="Open Sans" panose="020B0606030504020204" pitchFamily="34" charset="0"/>
-                          <a:cs typeface="Open Sans" panose="020B0606030504020204" pitchFamily="34" charset="0"/>
-                        </a:rPr>
-                        <a:t>générale</a:t>
-                      </a:r>
-                      <a:endParaRPr lang="en-US" sz="1600" b="1" kern="1200" dirty="0">
-                        <a:solidFill>
-                          <a:schemeClr val="tx1"/>
-                        </a:solidFill>
-                        <a:latin typeface="Open Sans" panose="020B0606030504020204" pitchFamily="34" charset="0"/>
-                        <a:ea typeface="Open Sans" panose="020B0606030504020204" pitchFamily="34" charset="0"/>
-                        <a:cs typeface="Open Sans" panose="020B0606030504020204" pitchFamily="34" charset="0"/>
-                      </a:endParaRPr>
                     </a:p>
                     <a:p>
                       <a:pPr marL="0" marR="0" indent="0" algn="l" defTabSz="914400" rtl="0" eaLnBrk="1" fontAlgn="auto" latinLnBrk="0" hangingPunct="1">
@@ -13784,10 +13501,10 @@
         </p:nvGrpSpPr>
         <p:grpSpPr>
           <a:xfrm>
-            <a:off x="2134401" y="757217"/>
-            <a:ext cx="8619454" cy="5089143"/>
-            <a:chOff x="2565325" y="715176"/>
-            <a:chExt cx="8619454" cy="5089143"/>
+            <a:off x="2003607" y="571628"/>
+            <a:ext cx="8619454" cy="6389376"/>
+            <a:chOff x="2434531" y="529587"/>
+            <a:chExt cx="8619454" cy="6827428"/>
           </a:xfrm>
         </p:grpSpPr>
         <p:graphicFrame>
@@ -13805,14 +13522,14 @@
             <p:nvPr>
               <p:extLst>
                 <p:ext uri="{D42A27DB-BD31-4B8C-83A1-F6EECF244321}">
-                  <p14:modId xmlns:p14="http://schemas.microsoft.com/office/powerpoint/2010/main" val="3035887194"/>
+                  <p14:modId xmlns:p14="http://schemas.microsoft.com/office/powerpoint/2010/main" val="3191700581"/>
                 </p:ext>
               </p:extLst>
             </p:nvPr>
           </p:nvGraphicFramePr>
           <p:xfrm>
-            <a:off x="2565325" y="715176"/>
-            <a:ext cx="8619454" cy="5089143"/>
+            <a:off x="2434531" y="529587"/>
+            <a:ext cx="8619454" cy="6827428"/>
           </p:xfrm>
           <a:graphic>
             <a:graphicData uri="http://schemas.openxmlformats.org/drawingml/2006/table">
@@ -14122,10 +13839,30 @@
                       <a:bodyPr/>
                       <a:lstStyle/>
                       <a:p>
+                        <a:pPr marL="0" marR="0" lvl="0" indent="0" algn="l" defTabSz="914400" rtl="0" eaLnBrk="1" fontAlgn="auto" latinLnBrk="0" hangingPunct="1">
+                          <a:lnSpc>
+                            <a:spcPct val="100000"/>
+                          </a:lnSpc>
+                          <a:spcBef>
+                            <a:spcPts val="0"/>
+                          </a:spcBef>
+                          <a:spcAft>
+                            <a:spcPts val="0"/>
+                          </a:spcAft>
+                          <a:buClrTx/>
+                          <a:buSzTx/>
+                          <a:buFontTx/>
+                          <a:buNone/>
+                          <a:tabLst/>
+                          <a:defRPr/>
+                        </a:pPr>
                         <a:r>
                           <a:rPr lang="fr-FR" dirty="0"/>
                           <a:t>PostgreSQL</a:t>
                         </a:r>
+                      </a:p>
+                      <a:p>
+                        <a:endParaRPr lang="fr-FR" dirty="0"/>
                       </a:p>
                     </a:txBody>
                     <a:tcPr>
@@ -14222,6 +13959,116 @@
                   </a:tc>
                   <a:extLst>
                     <a:ext uri="{0D108BD9-81ED-4DB2-BD59-A6C34878D82A}">
+                      <a16:rowId xmlns:a16="http://schemas.microsoft.com/office/drawing/2014/main" val="703901941"/>
+                    </a:ext>
+                  </a:extLst>
+                </a:tr>
+                <a:tr h="1300233">
+                  <a:tc>
+                    <a:txBody>
+                      <a:bodyPr/>
+                      <a:lstStyle/>
+                      <a:p>
+                        <a:r>
+                          <a:rPr lang="fr-FR" dirty="0"/>
+                          <a:t>Postman</a:t>
+                        </a:r>
+                      </a:p>
+                    </a:txBody>
+                    <a:tcPr>
+                      <a:lnL w="12700" cap="flat" cmpd="sng" algn="ctr">
+                        <a:solidFill>
+                          <a:schemeClr val="tx1"/>
+                        </a:solidFill>
+                        <a:prstDash val="solid"/>
+                        <a:round/>
+                        <a:headEnd type="none" w="med" len="med"/>
+                        <a:tailEnd type="none" w="med" len="med"/>
+                      </a:lnL>
+                      <a:lnR w="12700" cap="flat" cmpd="sng" algn="ctr">
+                        <a:solidFill>
+                          <a:schemeClr val="tx1"/>
+                        </a:solidFill>
+                        <a:prstDash val="solid"/>
+                        <a:round/>
+                        <a:headEnd type="none" w="med" len="med"/>
+                        <a:tailEnd type="none" w="med" len="med"/>
+                      </a:lnR>
+                      <a:lnT w="12700" cap="flat" cmpd="sng" algn="ctr">
+                        <a:solidFill>
+                          <a:schemeClr val="tx1"/>
+                        </a:solidFill>
+                        <a:prstDash val="solid"/>
+                        <a:round/>
+                        <a:headEnd type="none" w="med" len="med"/>
+                        <a:tailEnd type="none" w="med" len="med"/>
+                      </a:lnT>
+                      <a:lnB w="12700" cap="flat" cmpd="sng" algn="ctr">
+                        <a:solidFill>
+                          <a:schemeClr val="tx1"/>
+                        </a:solidFill>
+                        <a:prstDash val="solid"/>
+                        <a:round/>
+                        <a:headEnd type="none" w="med" len="med"/>
+                        <a:tailEnd type="none" w="med" len="med"/>
+                      </a:lnB>
+                      <a:solidFill>
+                        <a:schemeClr val="bg1"/>
+                      </a:solidFill>
+                    </a:tcPr>
+                  </a:tc>
+                  <a:tc>
+                    <a:txBody>
+                      <a:bodyPr/>
+                      <a:lstStyle/>
+                      <a:p>
+                        <a:endParaRPr lang="fr-FR" dirty="0"/>
+                      </a:p>
+                    </a:txBody>
+                    <a:tcPr>
+                      <a:lnL w="12700" cap="flat" cmpd="sng" algn="ctr">
+                        <a:solidFill>
+                          <a:schemeClr val="tx1"/>
+                        </a:solidFill>
+                        <a:prstDash val="solid"/>
+                        <a:round/>
+                        <a:headEnd type="none" w="med" len="med"/>
+                        <a:tailEnd type="none" w="med" len="med"/>
+                      </a:lnL>
+                      <a:lnR w="12700" cap="flat" cmpd="sng" algn="ctr">
+                        <a:solidFill>
+                          <a:schemeClr val="tx1"/>
+                        </a:solidFill>
+                        <a:prstDash val="solid"/>
+                        <a:round/>
+                        <a:headEnd type="none" w="med" len="med"/>
+                        <a:tailEnd type="none" w="med" len="med"/>
+                      </a:lnR>
+                      <a:lnT w="12700" cap="flat" cmpd="sng" algn="ctr">
+                        <a:solidFill>
+                          <a:schemeClr val="tx1"/>
+                        </a:solidFill>
+                        <a:prstDash val="solid"/>
+                        <a:round/>
+                        <a:headEnd type="none" w="med" len="med"/>
+                        <a:tailEnd type="none" w="med" len="med"/>
+                      </a:lnT>
+                      <a:lnB w="12700" cap="flat" cmpd="sng" algn="ctr">
+                        <a:solidFill>
+                          <a:schemeClr val="tx1"/>
+                        </a:solidFill>
+                        <a:prstDash val="solid"/>
+                        <a:round/>
+                        <a:headEnd type="none" w="med" len="med"/>
+                        <a:tailEnd type="none" w="med" len="med"/>
+                      </a:lnB>
+                      <a:solidFill>
+                        <a:schemeClr val="bg1"/>
+                      </a:solidFill>
+                    </a:tcPr>
+                  </a:tc>
+                  <a:extLst>
+                    <a:ext uri="{0D108BD9-81ED-4DB2-BD59-A6C34878D82A}">
                       <a16:rowId xmlns:a16="http://schemas.microsoft.com/office/drawing/2014/main" val="677377590"/>
                     </a:ext>
                   </a:extLst>
@@ -14257,7 +14104,7 @@
           </p:blipFill>
           <p:spPr bwMode="auto">
             <a:xfrm>
-              <a:off x="4228510" y="2040739"/>
+              <a:off x="4233013" y="1896828"/>
               <a:ext cx="1024975" cy="1017386"/>
             </a:xfrm>
             <a:prstGeom prst="rect">
@@ -14297,8 +14144,8 @@
           </p:blipFill>
           <p:spPr>
             <a:xfrm>
-              <a:off x="8770500" y="1902674"/>
-              <a:ext cx="1171485" cy="1171485"/>
+              <a:off x="9106420" y="1866915"/>
+              <a:ext cx="975011" cy="975011"/>
             </a:xfrm>
             <a:prstGeom prst="rect">
               <a:avLst/>
@@ -14334,7 +14181,7 @@
           </p:blipFill>
           <p:spPr bwMode="auto">
             <a:xfrm>
-              <a:off x="5568796" y="3259748"/>
+              <a:off x="5549175" y="3286623"/>
               <a:ext cx="609600" cy="1137425"/>
             </a:xfrm>
             <a:prstGeom prst="rect">
@@ -14379,7 +14226,7 @@
           </p:blipFill>
           <p:spPr bwMode="auto">
             <a:xfrm>
-              <a:off x="8880494" y="3329735"/>
+              <a:off x="9106420" y="3326344"/>
               <a:ext cx="910115" cy="997449"/>
             </a:xfrm>
             <a:prstGeom prst="rect">
@@ -14424,7 +14271,7 @@
           </p:blipFill>
           <p:spPr bwMode="auto">
             <a:xfrm>
-              <a:off x="3933108" y="4571349"/>
+              <a:off x="4048655" y="4689769"/>
               <a:ext cx="1940488" cy="1018920"/>
             </a:xfrm>
             <a:prstGeom prst="rect">
@@ -14471,8 +14318,8 @@
         </p:blipFill>
         <p:spPr>
           <a:xfrm>
-            <a:off x="-209449" y="4895990"/>
-            <a:ext cx="2213056" cy="1252590"/>
+            <a:off x="5092949" y="3766316"/>
+            <a:ext cx="2435872" cy="1378704"/>
           </a:xfrm>
           <a:prstGeom prst="rect">
             <a:avLst/>
@@ -14508,6 +14355,42 @@
           </a:p>
         </p:txBody>
       </p:sp>
+      <p:pic>
+        <p:nvPicPr>
+          <p:cNvPr id="20" name="Image 19">
+            <a:extLst>
+              <a:ext uri="{FF2B5EF4-FFF2-40B4-BE49-F238E27FC236}">
+                <a16:creationId xmlns:a16="http://schemas.microsoft.com/office/drawing/2014/main" id="{B5F1674D-F65A-9D50-3D88-8EDB7B25B98F}"/>
+              </a:ext>
+            </a:extLst>
+          </p:cNvPr>
+          <p:cNvPicPr>
+            <a:picLocks noChangeAspect="1"/>
+          </p:cNvPicPr>
+          <p:nvPr/>
+        </p:nvPicPr>
+        <p:blipFill>
+          <a:blip r:embed="rId8">
+            <a:extLst>
+              <a:ext uri="{28A0092B-C50C-407E-A947-70E740481C1C}">
+                <a14:useLocalDpi xmlns:a14="http://schemas.microsoft.com/office/drawing/2010/main" val="0"/>
+              </a:ext>
+            </a:extLst>
+          </a:blip>
+          <a:stretch>
+            <a:fillRect/>
+          </a:stretch>
+        </p:blipFill>
+        <p:spPr>
+          <a:xfrm>
+            <a:off x="4071585" y="5775716"/>
+            <a:ext cx="1099793" cy="1099793"/>
+          </a:xfrm>
+          <a:prstGeom prst="rect">
+            <a:avLst/>
+          </a:prstGeom>
+        </p:spPr>
+      </p:pic>
     </p:spTree>
     <p:extLst>
       <p:ext uri="{BB962C8B-B14F-4D97-AF65-F5344CB8AC3E}">
@@ -14789,10 +14672,10 @@
       </p:grpSpPr>
       <p:sp>
         <p:nvSpPr>
-          <p:cNvPr id="2" name="Titre 1">
+          <p:cNvPr id="8" name="Espace réservé du numéro de diapositive 7">
             <a:extLst>
               <a:ext uri="{FF2B5EF4-FFF2-40B4-BE49-F238E27FC236}">
-                <a16:creationId xmlns:a16="http://schemas.microsoft.com/office/drawing/2014/main" id="{8145E772-BA01-9E5D-00F7-8C557E453CF4}"/>
+                <a16:creationId xmlns:a16="http://schemas.microsoft.com/office/drawing/2014/main" id="{CA3143A8-D022-A759-2B8E-7E30CF59E316}"/>
               </a:ext>
             </a:extLst>
           </p:cNvPr>
@@ -14800,7 +14683,7 @@
             <a:spLocks noGrp="1"/>
           </p:cNvSpPr>
           <p:nvPr>
-            <p:ph type="title"/>
+            <p:ph type="sldNum" sz="quarter" idx="12"/>
           </p:nvPr>
         </p:nvSpPr>
         <p:spPr/>
@@ -14808,20 +14691,641 @@
           <a:bodyPr/>
           <a:lstStyle/>
           <a:p>
+            <a:fld id="{8884DEA1-B58E-449F-B7DA-47C0412597B5}" type="slidenum">
+              <a:rPr lang="fr-FR" smtClean="0"/>
+              <a:t>9</a:t>
+            </a:fld>
+            <a:endParaRPr lang="fr-FR"/>
+          </a:p>
+        </p:txBody>
+      </p:sp>
+      <p:sp>
+        <p:nvSpPr>
+          <p:cNvPr id="14" name="Organigramme : Disque magnétique 13">
+            <a:extLst>
+              <a:ext uri="{FF2B5EF4-FFF2-40B4-BE49-F238E27FC236}">
+                <a16:creationId xmlns:a16="http://schemas.microsoft.com/office/drawing/2014/main" id="{DB6332B7-95BE-3C89-143E-00BA74CFBFCD}"/>
+              </a:ext>
+            </a:extLst>
+          </p:cNvPr>
+          <p:cNvSpPr/>
+          <p:nvPr/>
+        </p:nvSpPr>
+        <p:spPr>
+          <a:xfrm>
+            <a:off x="10553700" y="2348992"/>
+            <a:ext cx="1422400" cy="1659128"/>
+          </a:xfrm>
+          <a:prstGeom prst="flowChartMagneticDisk">
+            <a:avLst/>
+          </a:prstGeom>
+        </p:spPr>
+        <p:style>
+          <a:lnRef idx="2">
+            <a:schemeClr val="accent1">
+              <a:shade val="50000"/>
+            </a:schemeClr>
+          </a:lnRef>
+          <a:fillRef idx="1">
+            <a:schemeClr val="accent1"/>
+          </a:fillRef>
+          <a:effectRef idx="0">
+            <a:schemeClr val="accent1"/>
+          </a:effectRef>
+          <a:fontRef idx="minor">
+            <a:schemeClr val="lt1"/>
+          </a:fontRef>
+        </p:style>
+        <p:txBody>
+          <a:bodyPr rtlCol="0" anchor="ctr"/>
+          <a:lstStyle/>
+          <a:p>
+            <a:pPr algn="ctr"/>
             <a:r>
-              <a:rPr lang="fr-FR"/>
-              <a:t>Interface Graphique</a:t>
+              <a:rPr lang="fr-FR" dirty="0" err="1"/>
+              <a:t>PostrgeSQL</a:t>
             </a:r>
             <a:endParaRPr lang="fr-FR" dirty="0"/>
+          </a:p>
+        </p:txBody>
+      </p:sp>
+      <p:sp>
+        <p:nvSpPr>
+          <p:cNvPr id="15" name="Rectangle : coins arrondis 14">
+            <a:extLst>
+              <a:ext uri="{FF2B5EF4-FFF2-40B4-BE49-F238E27FC236}">
+                <a16:creationId xmlns:a16="http://schemas.microsoft.com/office/drawing/2014/main" id="{79E59BCD-2A7A-2048-65E6-B612A3BEEE9E}"/>
+              </a:ext>
+            </a:extLst>
+          </p:cNvPr>
+          <p:cNvSpPr/>
+          <p:nvPr/>
+        </p:nvSpPr>
+        <p:spPr>
+          <a:xfrm>
+            <a:off x="99696" y="2624836"/>
+            <a:ext cx="2326640" cy="1270000"/>
+          </a:xfrm>
+          <a:prstGeom prst="roundRect">
+            <a:avLst/>
+          </a:prstGeom>
+        </p:spPr>
+        <p:style>
+          <a:lnRef idx="2">
+            <a:schemeClr val="accent1">
+              <a:shade val="50000"/>
+            </a:schemeClr>
+          </a:lnRef>
+          <a:fillRef idx="1">
+            <a:schemeClr val="accent1"/>
+          </a:fillRef>
+          <a:effectRef idx="0">
+            <a:schemeClr val="accent1"/>
+          </a:effectRef>
+          <a:fontRef idx="minor">
+            <a:schemeClr val="lt1"/>
+          </a:fontRef>
+        </p:style>
+        <p:txBody>
+          <a:bodyPr rtlCol="0" anchor="ctr"/>
+          <a:lstStyle/>
+          <a:p>
+            <a:pPr algn="ctr"/>
+            <a:r>
+              <a:rPr lang="fr-FR" dirty="0"/>
+              <a:t>Component</a:t>
+            </a:r>
+          </a:p>
+        </p:txBody>
+      </p:sp>
+      <p:sp>
+        <p:nvSpPr>
+          <p:cNvPr id="16" name="Rectangle : coins arrondis 15">
+            <a:extLst>
+              <a:ext uri="{FF2B5EF4-FFF2-40B4-BE49-F238E27FC236}">
+                <a16:creationId xmlns:a16="http://schemas.microsoft.com/office/drawing/2014/main" id="{B12C0DD6-C51A-05A7-1D59-20AA06B0A8F7}"/>
+              </a:ext>
+            </a:extLst>
+          </p:cNvPr>
+          <p:cNvSpPr/>
+          <p:nvPr/>
+        </p:nvSpPr>
+        <p:spPr>
+          <a:xfrm>
+            <a:off x="2545715" y="2632964"/>
+            <a:ext cx="2326640" cy="1270000"/>
+          </a:xfrm>
+          <a:prstGeom prst="roundRect">
+            <a:avLst/>
+          </a:prstGeom>
+        </p:spPr>
+        <p:style>
+          <a:lnRef idx="2">
+            <a:schemeClr val="accent1">
+              <a:shade val="50000"/>
+            </a:schemeClr>
+          </a:lnRef>
+          <a:fillRef idx="1">
+            <a:schemeClr val="accent1"/>
+          </a:fillRef>
+          <a:effectRef idx="0">
+            <a:schemeClr val="accent1"/>
+          </a:effectRef>
+          <a:fontRef idx="minor">
+            <a:schemeClr val="lt1"/>
+          </a:fontRef>
+        </p:style>
+        <p:txBody>
+          <a:bodyPr rtlCol="0" anchor="ctr"/>
+          <a:lstStyle/>
+          <a:p>
+            <a:pPr algn="ctr"/>
+            <a:r>
+              <a:rPr lang="fr-FR" dirty="0"/>
+              <a:t>Service</a:t>
+            </a:r>
+          </a:p>
+        </p:txBody>
+      </p:sp>
+      <p:sp>
+        <p:nvSpPr>
+          <p:cNvPr id="17" name="Rectangle : coins arrondis 16">
+            <a:extLst>
+              <a:ext uri="{FF2B5EF4-FFF2-40B4-BE49-F238E27FC236}">
+                <a16:creationId xmlns:a16="http://schemas.microsoft.com/office/drawing/2014/main" id="{EF6D7AAB-9DB5-74AB-0FF5-15CE5914C5B3}"/>
+              </a:ext>
+            </a:extLst>
+          </p:cNvPr>
+          <p:cNvSpPr/>
+          <p:nvPr/>
+        </p:nvSpPr>
+        <p:spPr>
+          <a:xfrm>
+            <a:off x="6577332" y="2624836"/>
+            <a:ext cx="1651000" cy="1270000"/>
+          </a:xfrm>
+          <a:prstGeom prst="roundRect">
+            <a:avLst/>
+          </a:prstGeom>
+          <a:solidFill>
+            <a:srgbClr val="00B050"/>
+          </a:solidFill>
+        </p:spPr>
+        <p:style>
+          <a:lnRef idx="2">
+            <a:schemeClr val="accent1">
+              <a:shade val="50000"/>
+            </a:schemeClr>
+          </a:lnRef>
+          <a:fillRef idx="1">
+            <a:schemeClr val="accent1"/>
+          </a:fillRef>
+          <a:effectRef idx="0">
+            <a:schemeClr val="accent1"/>
+          </a:effectRef>
+          <a:fontRef idx="minor">
+            <a:schemeClr val="lt1"/>
+          </a:fontRef>
+        </p:style>
+        <p:txBody>
+          <a:bodyPr rtlCol="0" anchor="ctr"/>
+          <a:lstStyle/>
+          <a:p>
+            <a:pPr algn="ctr"/>
+            <a:r>
+              <a:rPr lang="fr-FR" dirty="0" err="1"/>
+              <a:t>Rest</a:t>
+            </a:r>
+            <a:r>
+              <a:rPr lang="fr-FR" dirty="0"/>
+              <a:t> </a:t>
+            </a:r>
+            <a:r>
+              <a:rPr lang="fr-FR" dirty="0" err="1"/>
+              <a:t>Controllers</a:t>
+            </a:r>
+            <a:endParaRPr lang="fr-FR" dirty="0"/>
+          </a:p>
+        </p:txBody>
+      </p:sp>
+      <p:sp>
+        <p:nvSpPr>
+          <p:cNvPr id="18" name="Rectangle : coins arrondis 17">
+            <a:extLst>
+              <a:ext uri="{FF2B5EF4-FFF2-40B4-BE49-F238E27FC236}">
+                <a16:creationId xmlns:a16="http://schemas.microsoft.com/office/drawing/2014/main" id="{D6BB8B0F-F74A-E303-0653-E9EDFAF0C8C0}"/>
+              </a:ext>
+            </a:extLst>
+          </p:cNvPr>
+          <p:cNvSpPr/>
+          <p:nvPr/>
+        </p:nvSpPr>
+        <p:spPr>
+          <a:xfrm>
+            <a:off x="8500747" y="2632964"/>
+            <a:ext cx="1651000" cy="1270000"/>
+          </a:xfrm>
+          <a:prstGeom prst="roundRect">
+            <a:avLst/>
+          </a:prstGeom>
+          <a:solidFill>
+            <a:srgbClr val="00B050"/>
+          </a:solidFill>
+        </p:spPr>
+        <p:style>
+          <a:lnRef idx="2">
+            <a:schemeClr val="accent1">
+              <a:shade val="50000"/>
+            </a:schemeClr>
+          </a:lnRef>
+          <a:fillRef idx="1">
+            <a:schemeClr val="accent1"/>
+          </a:fillRef>
+          <a:effectRef idx="0">
+            <a:schemeClr val="accent1"/>
+          </a:effectRef>
+          <a:fontRef idx="minor">
+            <a:schemeClr val="lt1"/>
+          </a:fontRef>
+        </p:style>
+        <p:txBody>
+          <a:bodyPr rtlCol="0" anchor="ctr"/>
+          <a:lstStyle/>
+          <a:p>
+            <a:pPr algn="ctr"/>
+            <a:r>
+              <a:rPr lang="fr-FR" dirty="0"/>
+              <a:t>Spring Data JPA</a:t>
+            </a:r>
+          </a:p>
+        </p:txBody>
+      </p:sp>
+      <p:sp>
+        <p:nvSpPr>
+          <p:cNvPr id="20" name="Rectangle : coins arrondis 19">
+            <a:extLst>
+              <a:ext uri="{FF2B5EF4-FFF2-40B4-BE49-F238E27FC236}">
+                <a16:creationId xmlns:a16="http://schemas.microsoft.com/office/drawing/2014/main" id="{5BF35E02-5A7F-BCB6-BEAF-5BD7CEFF3452}"/>
+              </a:ext>
+            </a:extLst>
+          </p:cNvPr>
+          <p:cNvSpPr/>
+          <p:nvPr/>
+        </p:nvSpPr>
+        <p:spPr>
+          <a:xfrm>
+            <a:off x="5092703" y="2632964"/>
+            <a:ext cx="1259840" cy="1270000"/>
+          </a:xfrm>
+          <a:prstGeom prst="roundRect">
+            <a:avLst/>
+          </a:prstGeom>
+          <a:solidFill>
+            <a:srgbClr val="FF0000"/>
+          </a:solidFill>
+        </p:spPr>
+        <p:style>
+          <a:lnRef idx="2">
+            <a:schemeClr val="accent1">
+              <a:shade val="50000"/>
+            </a:schemeClr>
+          </a:lnRef>
+          <a:fillRef idx="1">
+            <a:schemeClr val="accent1"/>
+          </a:fillRef>
+          <a:effectRef idx="0">
+            <a:schemeClr val="accent1"/>
+          </a:effectRef>
+          <a:fontRef idx="minor">
+            <a:schemeClr val="lt1"/>
+          </a:fontRef>
+        </p:style>
+        <p:txBody>
+          <a:bodyPr rtlCol="0" anchor="ctr"/>
+          <a:lstStyle/>
+          <a:p>
+            <a:pPr algn="ctr"/>
+            <a:r>
+              <a:rPr lang="fr-FR" dirty="0"/>
+              <a:t>HTTP Client</a:t>
+            </a:r>
+          </a:p>
+        </p:txBody>
+      </p:sp>
+      <p:sp>
+        <p:nvSpPr>
+          <p:cNvPr id="21" name="Flèche : droite 20">
+            <a:extLst>
+              <a:ext uri="{FF2B5EF4-FFF2-40B4-BE49-F238E27FC236}">
+                <a16:creationId xmlns:a16="http://schemas.microsoft.com/office/drawing/2014/main" id="{942C64C5-A7CF-A105-2F45-4E7A3E538DB1}"/>
+              </a:ext>
+            </a:extLst>
+          </p:cNvPr>
+          <p:cNvSpPr/>
+          <p:nvPr/>
+        </p:nvSpPr>
+        <p:spPr>
+          <a:xfrm>
+            <a:off x="10144763" y="2936240"/>
+            <a:ext cx="463546" cy="162560"/>
+          </a:xfrm>
+          <a:prstGeom prst="rightArrow">
+            <a:avLst/>
+          </a:prstGeom>
+          <a:solidFill>
+            <a:schemeClr val="accent4">
+              <a:lumMod val="60000"/>
+              <a:lumOff val="40000"/>
+            </a:schemeClr>
+          </a:solidFill>
+        </p:spPr>
+        <p:style>
+          <a:lnRef idx="2">
+            <a:schemeClr val="accent1">
+              <a:shade val="50000"/>
+            </a:schemeClr>
+          </a:lnRef>
+          <a:fillRef idx="1">
+            <a:schemeClr val="accent1"/>
+          </a:fillRef>
+          <a:effectRef idx="0">
+            <a:schemeClr val="accent1"/>
+          </a:effectRef>
+          <a:fontRef idx="minor">
+            <a:schemeClr val="lt1"/>
+          </a:fontRef>
+        </p:style>
+        <p:txBody>
+          <a:bodyPr rtlCol="0" anchor="ctr"/>
+          <a:lstStyle/>
+          <a:p>
+            <a:pPr algn="ctr"/>
+            <a:endParaRPr lang="fr-FR"/>
+          </a:p>
+        </p:txBody>
+      </p:sp>
+      <p:sp>
+        <p:nvSpPr>
+          <p:cNvPr id="22" name="Flèche : droite 21">
+            <a:extLst>
+              <a:ext uri="{FF2B5EF4-FFF2-40B4-BE49-F238E27FC236}">
+                <a16:creationId xmlns:a16="http://schemas.microsoft.com/office/drawing/2014/main" id="{21108A3A-A5E7-C349-370E-788B4EB6B583}"/>
+              </a:ext>
+            </a:extLst>
+          </p:cNvPr>
+          <p:cNvSpPr/>
+          <p:nvPr/>
+        </p:nvSpPr>
+        <p:spPr>
+          <a:xfrm rot="10800000">
+            <a:off x="10120951" y="3338322"/>
+            <a:ext cx="463546" cy="162560"/>
+          </a:xfrm>
+          <a:prstGeom prst="rightArrow">
+            <a:avLst/>
+          </a:prstGeom>
+          <a:solidFill>
+            <a:schemeClr val="accent4">
+              <a:lumMod val="60000"/>
+              <a:lumOff val="40000"/>
+            </a:schemeClr>
+          </a:solidFill>
+        </p:spPr>
+        <p:style>
+          <a:lnRef idx="2">
+            <a:schemeClr val="accent1">
+              <a:shade val="50000"/>
+            </a:schemeClr>
+          </a:lnRef>
+          <a:fillRef idx="1">
+            <a:schemeClr val="accent1"/>
+          </a:fillRef>
+          <a:effectRef idx="0">
+            <a:schemeClr val="accent1"/>
+          </a:effectRef>
+          <a:fontRef idx="minor">
+            <a:schemeClr val="lt1"/>
+          </a:fontRef>
+        </p:style>
+        <p:txBody>
+          <a:bodyPr rtlCol="0" anchor="ctr"/>
+          <a:lstStyle/>
+          <a:p>
+            <a:pPr algn="ctr"/>
+            <a:endParaRPr lang="fr-FR"/>
+          </a:p>
+        </p:txBody>
+      </p:sp>
+      <p:sp>
+        <p:nvSpPr>
+          <p:cNvPr id="23" name="Flèche : droite 22">
+            <a:extLst>
+              <a:ext uri="{FF2B5EF4-FFF2-40B4-BE49-F238E27FC236}">
+                <a16:creationId xmlns:a16="http://schemas.microsoft.com/office/drawing/2014/main" id="{DA3262B4-63B7-C430-0BBE-C56F7A1E8CB0}"/>
+              </a:ext>
+            </a:extLst>
+          </p:cNvPr>
+          <p:cNvSpPr/>
+          <p:nvPr/>
+        </p:nvSpPr>
+        <p:spPr>
+          <a:xfrm>
+            <a:off x="4675193" y="2946400"/>
+            <a:ext cx="2109467" cy="142240"/>
+          </a:xfrm>
+          <a:prstGeom prst="rightArrow">
+            <a:avLst/>
+          </a:prstGeom>
+          <a:solidFill>
+            <a:schemeClr val="accent4">
+              <a:lumMod val="60000"/>
+              <a:lumOff val="40000"/>
+            </a:schemeClr>
+          </a:solidFill>
+        </p:spPr>
+        <p:style>
+          <a:lnRef idx="2">
+            <a:schemeClr val="accent1">
+              <a:shade val="50000"/>
+            </a:schemeClr>
+          </a:lnRef>
+          <a:fillRef idx="1">
+            <a:schemeClr val="accent1"/>
+          </a:fillRef>
+          <a:effectRef idx="0">
+            <a:schemeClr val="accent1"/>
+          </a:effectRef>
+          <a:fontRef idx="minor">
+            <a:schemeClr val="lt1"/>
+          </a:fontRef>
+        </p:style>
+        <p:txBody>
+          <a:bodyPr rtlCol="0" anchor="ctr"/>
+          <a:lstStyle/>
+          <a:p>
+            <a:pPr algn="ctr"/>
+            <a:endParaRPr lang="fr-FR"/>
+          </a:p>
+        </p:txBody>
+      </p:sp>
+      <p:sp>
+        <p:nvSpPr>
+          <p:cNvPr id="24" name="Flèche : droite 23">
+            <a:extLst>
+              <a:ext uri="{FF2B5EF4-FFF2-40B4-BE49-F238E27FC236}">
+                <a16:creationId xmlns:a16="http://schemas.microsoft.com/office/drawing/2014/main" id="{603AC2BB-5C2D-CF4A-2117-5804419BDBCA}"/>
+              </a:ext>
+            </a:extLst>
+          </p:cNvPr>
+          <p:cNvSpPr/>
+          <p:nvPr/>
+        </p:nvSpPr>
+        <p:spPr>
+          <a:xfrm rot="10800000">
+            <a:off x="4775523" y="3526282"/>
+            <a:ext cx="2009137" cy="142240"/>
+          </a:xfrm>
+          <a:prstGeom prst="rightArrow">
+            <a:avLst/>
+          </a:prstGeom>
+          <a:solidFill>
+            <a:schemeClr val="accent4">
+              <a:lumMod val="60000"/>
+              <a:lumOff val="40000"/>
+            </a:schemeClr>
+          </a:solidFill>
+        </p:spPr>
+        <p:style>
+          <a:lnRef idx="2">
+            <a:schemeClr val="accent1">
+              <a:shade val="50000"/>
+            </a:schemeClr>
+          </a:lnRef>
+          <a:fillRef idx="1">
+            <a:schemeClr val="accent1"/>
+          </a:fillRef>
+          <a:effectRef idx="0">
+            <a:schemeClr val="accent1"/>
+          </a:effectRef>
+          <a:fontRef idx="minor">
+            <a:schemeClr val="lt1"/>
+          </a:fontRef>
+        </p:style>
+        <p:txBody>
+          <a:bodyPr rtlCol="0" anchor="ctr"/>
+          <a:lstStyle/>
+          <a:p>
+            <a:pPr algn="ctr"/>
+            <a:endParaRPr lang="fr-FR"/>
+          </a:p>
+        </p:txBody>
+      </p:sp>
+      <p:sp>
+        <p:nvSpPr>
+          <p:cNvPr id="25" name="Rectangle 24">
+            <a:extLst>
+              <a:ext uri="{FF2B5EF4-FFF2-40B4-BE49-F238E27FC236}">
+                <a16:creationId xmlns:a16="http://schemas.microsoft.com/office/drawing/2014/main" id="{58756DB0-91BE-4775-86A0-C10616592F3E}"/>
+              </a:ext>
+            </a:extLst>
+          </p:cNvPr>
+          <p:cNvSpPr/>
+          <p:nvPr/>
+        </p:nvSpPr>
+        <p:spPr>
+          <a:xfrm>
+            <a:off x="36195" y="1849120"/>
+            <a:ext cx="5019040" cy="3434080"/>
+          </a:xfrm>
+          <a:prstGeom prst="rect">
+            <a:avLst/>
+          </a:prstGeom>
+          <a:noFill/>
+          <a:ln>
+            <a:prstDash val="sysDot"/>
+          </a:ln>
+        </p:spPr>
+        <p:style>
+          <a:lnRef idx="2">
+            <a:schemeClr val="accent1">
+              <a:shade val="50000"/>
+            </a:schemeClr>
+          </a:lnRef>
+          <a:fillRef idx="1">
+            <a:schemeClr val="accent1"/>
+          </a:fillRef>
+          <a:effectRef idx="0">
+            <a:schemeClr val="accent1"/>
+          </a:effectRef>
+          <a:fontRef idx="minor">
+            <a:schemeClr val="lt1"/>
+          </a:fontRef>
+        </p:style>
+        <p:txBody>
+          <a:bodyPr rtlCol="0" anchor="ctr"/>
+          <a:lstStyle/>
+          <a:p>
+            <a:pPr algn="ctr"/>
+            <a:endParaRPr lang="fr-FR"/>
+          </a:p>
+        </p:txBody>
+      </p:sp>
+      <p:sp>
+        <p:nvSpPr>
+          <p:cNvPr id="26" name="Rectangle 25">
+            <a:extLst>
+              <a:ext uri="{FF2B5EF4-FFF2-40B4-BE49-F238E27FC236}">
+                <a16:creationId xmlns:a16="http://schemas.microsoft.com/office/drawing/2014/main" id="{6363F418-15C8-318B-2464-756EB953ADB5}"/>
+              </a:ext>
+            </a:extLst>
+          </p:cNvPr>
+          <p:cNvSpPr/>
+          <p:nvPr/>
+        </p:nvSpPr>
+        <p:spPr>
+          <a:xfrm>
+            <a:off x="6390011" y="1809241"/>
+            <a:ext cx="3980809" cy="3434080"/>
+          </a:xfrm>
+          <a:prstGeom prst="rect">
+            <a:avLst/>
+          </a:prstGeom>
+          <a:noFill/>
+          <a:ln>
+            <a:prstDash val="sysDot"/>
+          </a:ln>
+        </p:spPr>
+        <p:style>
+          <a:lnRef idx="2">
+            <a:schemeClr val="accent1">
+              <a:shade val="50000"/>
+            </a:schemeClr>
+          </a:lnRef>
+          <a:fillRef idx="1">
+            <a:schemeClr val="accent1"/>
+          </a:fillRef>
+          <a:effectRef idx="0">
+            <a:schemeClr val="accent1"/>
+          </a:effectRef>
+          <a:fontRef idx="minor">
+            <a:schemeClr val="lt1"/>
+          </a:fontRef>
+        </p:style>
+        <p:txBody>
+          <a:bodyPr rtlCol="0" anchor="ctr"/>
+          <a:lstStyle/>
+          <a:p>
+            <a:pPr algn="ctr"/>
+            <a:endParaRPr lang="fr-FR"/>
           </a:p>
         </p:txBody>
       </p:sp>
       <p:pic>
         <p:nvPicPr>
-          <p:cNvPr id="7" name="Image 6">
+          <p:cNvPr id="27" name="Picture 2" descr="Angular — Wikipédia">
             <a:extLst>
               <a:ext uri="{FF2B5EF4-FFF2-40B4-BE49-F238E27FC236}">
-                <a16:creationId xmlns:a16="http://schemas.microsoft.com/office/drawing/2014/main" id="{1880B31E-282C-813C-0BE5-CF69B7684624}"/>
+                <a16:creationId xmlns:a16="http://schemas.microsoft.com/office/drawing/2014/main" id="{FE549B3E-16E3-DFCA-296B-16CCA7FD8190}"/>
               </a:ext>
             </a:extLst>
           </p:cNvPr>
@@ -14830,7 +15334,7 @@
           </p:cNvPicPr>
           <p:nvPr/>
         </p:nvPicPr>
-        <p:blipFill>
+        <p:blipFill rotWithShape="1">
           <a:blip r:embed="rId2">
             <a:extLst>
               <a:ext uri="{28A0092B-C50C-407E-A947-70E740481C1C}">
@@ -14838,26 +15342,35 @@
               </a:ext>
             </a:extLst>
           </a:blip>
-          <a:stretch>
-            <a:fillRect/>
-          </a:stretch>
+          <a:srcRect l="11913" t="7518" r="8389" b="5136"/>
+          <a:stretch/>
         </p:blipFill>
-        <p:spPr>
+        <p:spPr bwMode="auto">
           <a:xfrm>
-            <a:off x="674633" y="1329124"/>
-            <a:ext cx="5421367" cy="4900992"/>
+            <a:off x="2090657" y="1273810"/>
+            <a:ext cx="910115" cy="933452"/>
           </a:xfrm>
           <a:prstGeom prst="rect">
             <a:avLst/>
           </a:prstGeom>
+          <a:noFill/>
+          <a:extLst>
+            <a:ext uri="{909E8E84-426E-40DD-AFC4-6F175D3DCCD1}">
+              <a14:hiddenFill xmlns:a14="http://schemas.microsoft.com/office/drawing/2010/main">
+                <a:solidFill>
+                  <a:srgbClr val="FFFFFF"/>
+                </a:solidFill>
+              </a14:hiddenFill>
+            </a:ext>
+          </a:extLst>
         </p:spPr>
       </p:pic>
       <p:pic>
         <p:nvPicPr>
-          <p:cNvPr id="9" name="Image 8">
+          <p:cNvPr id="31" name="Image 30">
             <a:extLst>
               <a:ext uri="{FF2B5EF4-FFF2-40B4-BE49-F238E27FC236}">
-                <a16:creationId xmlns:a16="http://schemas.microsoft.com/office/drawing/2014/main" id="{B95BCFCA-166E-000A-F265-1DB4F99330DB}"/>
+                <a16:creationId xmlns:a16="http://schemas.microsoft.com/office/drawing/2014/main" id="{01611185-2E1F-61AF-6FD1-7B3BB6E1FEC6}"/>
               </a:ext>
             </a:extLst>
           </p:cNvPr>
@@ -14880,47 +15393,18 @@
         </p:blipFill>
         <p:spPr>
           <a:xfrm>
-            <a:off x="6096000" y="1245834"/>
-            <a:ext cx="5508423" cy="4984282"/>
+            <a:off x="7653020" y="1529332"/>
+            <a:ext cx="1915160" cy="493154"/>
           </a:xfrm>
           <a:prstGeom prst="rect">
             <a:avLst/>
           </a:prstGeom>
         </p:spPr>
       </p:pic>
-      <p:sp>
-        <p:nvSpPr>
-          <p:cNvPr id="10" name="Espace réservé du numéro de diapositive 9">
-            <a:extLst>
-              <a:ext uri="{FF2B5EF4-FFF2-40B4-BE49-F238E27FC236}">
-                <a16:creationId xmlns:a16="http://schemas.microsoft.com/office/drawing/2014/main" id="{2FC21EEF-C539-CA3C-B8AF-15F72A3854F4}"/>
-              </a:ext>
-            </a:extLst>
-          </p:cNvPr>
-          <p:cNvSpPr>
-            <a:spLocks noGrp="1"/>
-          </p:cNvSpPr>
-          <p:nvPr>
-            <p:ph type="sldNum" sz="quarter" idx="12"/>
-          </p:nvPr>
-        </p:nvSpPr>
-        <p:spPr/>
-        <p:txBody>
-          <a:bodyPr/>
-          <a:lstStyle/>
-          <a:p>
-            <a:fld id="{8884DEA1-B58E-449F-B7DA-47C0412597B5}" type="slidenum">
-              <a:rPr lang="fr-FR" smtClean="0"/>
-              <a:t>9</a:t>
-            </a:fld>
-            <a:endParaRPr lang="fr-FR"/>
-          </a:p>
-        </p:txBody>
-      </p:sp>
     </p:spTree>
     <p:extLst>
       <p:ext uri="{BB962C8B-B14F-4D97-AF65-F5344CB8AC3E}">
-        <p14:creationId xmlns:p14="http://schemas.microsoft.com/office/powerpoint/2010/main" val="92462453"/>
+        <p14:creationId xmlns:p14="http://schemas.microsoft.com/office/powerpoint/2010/main" val="3575519456"/>
       </p:ext>
     </p:extLst>
   </p:cSld>

</xml_diff>